<commit_message>
list view added + button functionality
</commit_message>
<xml_diff>
--- a/design-files/ts-icon.pptx
+++ b/design-files/ts-icon.pptx
@@ -1529,7 +1529,7 @@
             <a:fld id="{48A87A34-81AB-432B-8DAE-1953F412C126}" type="datetimeFigureOut">
               <a:rPr lang="en-US" smtClean="0"/>
               <a:pPr/>
-              <a:t>2/2/21</a:t>
+              <a:t>2/3/21</a:t>
             </a:fld>
             <a:endParaRPr lang="en-US" dirty="0"/>
           </a:p>
@@ -2988,7 +2988,7 @@
           <a:p>
             <a:fld id="{48A87A34-81AB-432B-8DAE-1953F412C126}" type="datetimeFigureOut">
               <a:rPr lang="en-US" smtClean="0"/>
-              <a:t>2/2/21</a:t>
+              <a:t>2/3/21</a:t>
             </a:fld>
             <a:endParaRPr lang="en-US" dirty="0"/>
           </a:p>
@@ -4441,7 +4441,7 @@
           <a:p>
             <a:fld id="{48A87A34-81AB-432B-8DAE-1953F412C126}" type="datetimeFigureOut">
               <a:rPr lang="en-US" smtClean="0"/>
-              <a:t>2/2/21</a:t>
+              <a:t>2/3/21</a:t>
             </a:fld>
             <a:endParaRPr lang="en-US" dirty="0"/>
           </a:p>
@@ -4627,7 +4627,7 @@
             <a:fld id="{45035A38-16F1-416B-B876-96D894A2DCAD}" type="datetimeFigureOut">
               <a:rPr lang="en-GB" smtClean="0"/>
               <a:pPr/>
-              <a:t>02/02/2021</a:t>
+              <a:t>03/02/2021</a:t>
             </a:fld>
             <a:endParaRPr lang="en-GB"/>
           </a:p>
@@ -6241,7 +6241,7 @@
             <a:fld id="{45035A38-16F1-416B-B876-96D894A2DCAD}" type="datetimeFigureOut">
               <a:rPr lang="en-GB" smtClean="0"/>
               <a:pPr/>
-              <a:t>02/02/2021</a:t>
+              <a:t>03/02/2021</a:t>
             </a:fld>
             <a:endParaRPr lang="en-GB"/>
           </a:p>
@@ -7751,7 +7751,7 @@
             <a:fld id="{45035A38-16F1-416B-B876-96D894A2DCAD}" type="datetimeFigureOut">
               <a:rPr lang="en-GB" smtClean="0"/>
               <a:pPr/>
-              <a:t>02/02/2021</a:t>
+              <a:t>03/02/2021</a:t>
             </a:fld>
             <a:endParaRPr lang="en-GB"/>
           </a:p>
@@ -9274,7 +9274,7 @@
             <a:fld id="{45035A38-16F1-416B-B876-96D894A2DCAD}" type="datetimeFigureOut">
               <a:rPr lang="en-GB" smtClean="0"/>
               <a:pPr/>
-              <a:t>02/02/2021</a:t>
+              <a:t>03/02/2021</a:t>
             </a:fld>
             <a:endParaRPr lang="en-GB"/>
           </a:p>
@@ -10941,7 +10941,7 @@
             <a:fld id="{45035A38-16F1-416B-B876-96D894A2DCAD}" type="datetimeFigureOut">
               <a:rPr lang="en-GB" smtClean="0"/>
               <a:pPr/>
-              <a:t>02/02/2021</a:t>
+              <a:t>03/02/2021</a:t>
             </a:fld>
             <a:endParaRPr lang="en-GB"/>
           </a:p>
@@ -12341,7 +12341,7 @@
             <a:fld id="{45035A38-16F1-416B-B876-96D894A2DCAD}" type="datetimeFigureOut">
               <a:rPr lang="en-GB" smtClean="0"/>
               <a:pPr/>
-              <a:t>02/02/2021</a:t>
+              <a:t>03/02/2021</a:t>
             </a:fld>
             <a:endParaRPr lang="en-GB"/>
           </a:p>
@@ -12443,7 +12443,7 @@
             <a:fld id="{45035A38-16F1-416B-B876-96D894A2DCAD}" type="datetimeFigureOut">
               <a:rPr lang="en-GB" smtClean="0"/>
               <a:pPr/>
-              <a:t>02/02/2021</a:t>
+              <a:t>03/02/2021</a:t>
             </a:fld>
             <a:endParaRPr lang="en-GB"/>
           </a:p>
@@ -13971,7 +13971,7 @@
             <a:fld id="{45035A38-16F1-416B-B876-96D894A2DCAD}" type="datetimeFigureOut">
               <a:rPr lang="en-GB" smtClean="0"/>
               <a:pPr/>
-              <a:t>02/02/2021</a:t>
+              <a:t>03/02/2021</a:t>
             </a:fld>
             <a:endParaRPr lang="en-GB"/>
           </a:p>
@@ -15509,7 +15509,7 @@
             <a:fld id="{45035A38-16F1-416B-B876-96D894A2DCAD}" type="datetimeFigureOut">
               <a:rPr lang="en-GB" smtClean="0"/>
               <a:pPr/>
-              <a:t>02/02/2021</a:t>
+              <a:t>03/02/2021</a:t>
             </a:fld>
             <a:endParaRPr lang="en-GB"/>
           </a:p>
@@ -15734,7 +15734,7 @@
             <a:fld id="{48A87A34-81AB-432B-8DAE-1953F412C126}" type="datetimeFigureOut">
               <a:rPr lang="en-US" smtClean="0"/>
               <a:pPr/>
-              <a:t>2/2/21</a:t>
+              <a:t>2/3/21</a:t>
             </a:fld>
             <a:endParaRPr lang="en-US" dirty="0"/>
           </a:p>
@@ -16783,7 +16783,7 @@
             </a:xfrm>
             <a:prstGeom prst="roundRect">
               <a:avLst>
-                <a:gd name="adj" fmla="val 7330"/>
+                <a:gd name="adj" fmla="val 16118"/>
               </a:avLst>
             </a:prstGeom>
             <a:solidFill>

</xml_diff>

<commit_message>
significant bug fixes in closed tab resurrection
</commit_message>
<xml_diff>
--- a/design-files/ts-icon.pptx
+++ b/design-files/ts-icon.pptx
@@ -6,10 +6,11 @@
   </p:sldMasterIdLst>
   <p:sldIdLst>
     <p:sldId id="256" r:id="rId2"/>
-    <p:sldId id="257" r:id="rId3"/>
-    <p:sldId id="258" r:id="rId4"/>
-    <p:sldId id="259" r:id="rId5"/>
-    <p:sldId id="260" r:id="rId6"/>
+    <p:sldId id="261" r:id="rId3"/>
+    <p:sldId id="257" r:id="rId4"/>
+    <p:sldId id="258" r:id="rId5"/>
+    <p:sldId id="259" r:id="rId6"/>
+    <p:sldId id="260" r:id="rId7"/>
   </p:sldIdLst>
   <p:sldSz cx="10239375" cy="5759450"/>
   <p:notesSz cx="6858000" cy="9144000"/>
@@ -1529,7 +1530,7 @@
             <a:fld id="{48A87A34-81AB-432B-8DAE-1953F412C126}" type="datetimeFigureOut">
               <a:rPr lang="en-US" smtClean="0"/>
               <a:pPr/>
-              <a:t>2/3/21</a:t>
+              <a:t>2/21/21</a:t>
             </a:fld>
             <a:endParaRPr lang="en-US" dirty="0"/>
           </a:p>
@@ -2988,7 +2989,7 @@
           <a:p>
             <a:fld id="{48A87A34-81AB-432B-8DAE-1953F412C126}" type="datetimeFigureOut">
               <a:rPr lang="en-US" smtClean="0"/>
-              <a:t>2/3/21</a:t>
+              <a:t>2/21/21</a:t>
             </a:fld>
             <a:endParaRPr lang="en-US" dirty="0"/>
           </a:p>
@@ -4441,7 +4442,7 @@
           <a:p>
             <a:fld id="{48A87A34-81AB-432B-8DAE-1953F412C126}" type="datetimeFigureOut">
               <a:rPr lang="en-US" smtClean="0"/>
-              <a:t>2/3/21</a:t>
+              <a:t>2/21/21</a:t>
             </a:fld>
             <a:endParaRPr lang="en-US" dirty="0"/>
           </a:p>
@@ -4627,7 +4628,7 @@
             <a:fld id="{45035A38-16F1-416B-B876-96D894A2DCAD}" type="datetimeFigureOut">
               <a:rPr lang="en-GB" smtClean="0"/>
               <a:pPr/>
-              <a:t>03/02/2021</a:t>
+              <a:t>21/02/2021</a:t>
             </a:fld>
             <a:endParaRPr lang="en-GB"/>
           </a:p>
@@ -6241,7 +6242,7 @@
             <a:fld id="{45035A38-16F1-416B-B876-96D894A2DCAD}" type="datetimeFigureOut">
               <a:rPr lang="en-GB" smtClean="0"/>
               <a:pPr/>
-              <a:t>03/02/2021</a:t>
+              <a:t>21/02/2021</a:t>
             </a:fld>
             <a:endParaRPr lang="en-GB"/>
           </a:p>
@@ -7751,7 +7752,7 @@
             <a:fld id="{45035A38-16F1-416B-B876-96D894A2DCAD}" type="datetimeFigureOut">
               <a:rPr lang="en-GB" smtClean="0"/>
               <a:pPr/>
-              <a:t>03/02/2021</a:t>
+              <a:t>21/02/2021</a:t>
             </a:fld>
             <a:endParaRPr lang="en-GB"/>
           </a:p>
@@ -9274,7 +9275,7 @@
             <a:fld id="{45035A38-16F1-416B-B876-96D894A2DCAD}" type="datetimeFigureOut">
               <a:rPr lang="en-GB" smtClean="0"/>
               <a:pPr/>
-              <a:t>03/02/2021</a:t>
+              <a:t>21/02/2021</a:t>
             </a:fld>
             <a:endParaRPr lang="en-GB"/>
           </a:p>
@@ -10941,7 +10942,7 @@
             <a:fld id="{45035A38-16F1-416B-B876-96D894A2DCAD}" type="datetimeFigureOut">
               <a:rPr lang="en-GB" smtClean="0"/>
               <a:pPr/>
-              <a:t>03/02/2021</a:t>
+              <a:t>21/02/2021</a:t>
             </a:fld>
             <a:endParaRPr lang="en-GB"/>
           </a:p>
@@ -12341,7 +12342,7 @@
             <a:fld id="{45035A38-16F1-416B-B876-96D894A2DCAD}" type="datetimeFigureOut">
               <a:rPr lang="en-GB" smtClean="0"/>
               <a:pPr/>
-              <a:t>03/02/2021</a:t>
+              <a:t>21/02/2021</a:t>
             </a:fld>
             <a:endParaRPr lang="en-GB"/>
           </a:p>
@@ -12443,7 +12444,7 @@
             <a:fld id="{45035A38-16F1-416B-B876-96D894A2DCAD}" type="datetimeFigureOut">
               <a:rPr lang="en-GB" smtClean="0"/>
               <a:pPr/>
-              <a:t>03/02/2021</a:t>
+              <a:t>21/02/2021</a:t>
             </a:fld>
             <a:endParaRPr lang="en-GB"/>
           </a:p>
@@ -13971,7 +13972,7 @@
             <a:fld id="{45035A38-16F1-416B-B876-96D894A2DCAD}" type="datetimeFigureOut">
               <a:rPr lang="en-GB" smtClean="0"/>
               <a:pPr/>
-              <a:t>03/02/2021</a:t>
+              <a:t>21/02/2021</a:t>
             </a:fld>
             <a:endParaRPr lang="en-GB"/>
           </a:p>
@@ -15509,7 +15510,7 @@
             <a:fld id="{45035A38-16F1-416B-B876-96D894A2DCAD}" type="datetimeFigureOut">
               <a:rPr lang="en-GB" smtClean="0"/>
               <a:pPr/>
-              <a:t>03/02/2021</a:t>
+              <a:t>21/02/2021</a:t>
             </a:fld>
             <a:endParaRPr lang="en-GB"/>
           </a:p>
@@ -15734,7 +15735,7 @@
             <a:fld id="{48A87A34-81AB-432B-8DAE-1953F412C126}" type="datetimeFigureOut">
               <a:rPr lang="en-US" smtClean="0"/>
               <a:pPr/>
-              <a:t>2/3/21</a:t>
+              <a:t>2/21/21</a:t>
             </a:fld>
             <a:endParaRPr lang="en-US" dirty="0"/>
           </a:p>
@@ -16462,10 +16463,10 @@
       </p:grpSpPr>
       <p:grpSp>
         <p:nvGrpSpPr>
-          <p:cNvPr id="25" name="Group 24">
+          <p:cNvPr id="27" name="Group 26">
             <a:extLst>
               <a:ext uri="{FF2B5EF4-FFF2-40B4-BE49-F238E27FC236}">
-                <a16:creationId xmlns:a16="http://schemas.microsoft.com/office/drawing/2014/main" id="{B2007DCD-B00C-6145-B354-3CA63C59E58F}"/>
+                <a16:creationId xmlns:a16="http://schemas.microsoft.com/office/drawing/2014/main" id="{E6937F8E-350B-814F-A4B9-18A272934703}"/>
               </a:ext>
             </a:extLst>
           </p:cNvPr>
@@ -16474,18 +16475,18 @@
         </p:nvGrpSpPr>
         <p:grpSpPr>
           <a:xfrm>
-            <a:off x="3120228" y="1278906"/>
-            <a:ext cx="3998917" cy="3201637"/>
-            <a:chOff x="6299895" y="2371809"/>
-            <a:chExt cx="3998917" cy="3201637"/>
+            <a:off x="1891009" y="2133132"/>
+            <a:ext cx="6457355" cy="1493186"/>
+            <a:chOff x="355310" y="1064628"/>
+            <a:chExt cx="6457355" cy="1493186"/>
           </a:xfrm>
         </p:grpSpPr>
         <p:sp>
           <p:nvSpPr>
-            <p:cNvPr id="17" name="Round Single Corner of Rectangle 5">
+            <p:cNvPr id="11" name="Round Single Corner of Rectangle 5">
               <a:extLst>
                 <a:ext uri="{FF2B5EF4-FFF2-40B4-BE49-F238E27FC236}">
-                  <a16:creationId xmlns:a16="http://schemas.microsoft.com/office/drawing/2014/main" id="{28F07AEA-2996-1C4B-982A-CB8065916A70}"/>
+                  <a16:creationId xmlns:a16="http://schemas.microsoft.com/office/drawing/2014/main" id="{C98DEE2D-843A-E646-A8CD-FA0282604948}"/>
                 </a:ext>
               </a:extLst>
             </p:cNvPr>
@@ -16494,7 +16495,7 @@
           </p:nvSpPr>
           <p:spPr>
             <a:xfrm flipH="1">
-              <a:off x="6531103" y="2444273"/>
+              <a:off x="586516" y="1064628"/>
               <a:ext cx="2429334" cy="1493185"/>
             </a:xfrm>
             <a:custGeom>
@@ -16616,10 +16617,10 @@
         </p:sp>
         <p:sp>
           <p:nvSpPr>
-            <p:cNvPr id="18" name="Round Single Corner of Rectangle 17">
+            <p:cNvPr id="5" name="Round Single Corner of Rectangle 4">
               <a:extLst>
                 <a:ext uri="{FF2B5EF4-FFF2-40B4-BE49-F238E27FC236}">
-                  <a16:creationId xmlns:a16="http://schemas.microsoft.com/office/drawing/2014/main" id="{A377C311-6164-094C-AC1E-D8153EE34984}"/>
+                  <a16:creationId xmlns:a16="http://schemas.microsoft.com/office/drawing/2014/main" id="{E30D90F8-6CE6-8C48-99B2-4E935A543F96}"/>
                 </a:ext>
               </a:extLst>
             </p:cNvPr>
@@ -16628,8 +16629,8 @@
           </p:nvSpPr>
           <p:spPr>
             <a:xfrm flipH="1">
-              <a:off x="6299895" y="2371809"/>
-              <a:ext cx="3998917" cy="3201637"/>
+              <a:off x="355310" y="1178168"/>
+              <a:ext cx="6457355" cy="1379646"/>
             </a:xfrm>
             <a:prstGeom prst="round1Rect">
               <a:avLst>
@@ -16663,13 +16664,13 @@
             <a:p>
               <a:pPr>
                 <a:lnSpc>
-                  <a:spcPct val="55000"/>
+                  <a:spcPct val="70000"/>
                 </a:lnSpc>
               </a:pPr>
               <a:r>
                 <a:rPr lang="en-US" sz="13800" spc="-150" dirty="0">
                   <a:solidFill>
-                    <a:schemeClr val="bg2"/>
+                    <a:schemeClr val="tx1"/>
                   </a:solidFill>
                   <a:latin typeface="Tw Cen MT" panose="020B0602020104020603" pitchFamily="34" charset="77"/>
                 </a:rPr>
@@ -16684,19 +16685,10 @@
                 </a:rPr>
                 <a:t> </a:t>
               </a:r>
-            </a:p>
-            <a:p>
-              <a:pPr>
-                <a:lnSpc>
-                  <a:spcPct val="55000"/>
-                </a:lnSpc>
-              </a:pPr>
               <a:r>
                 <a:rPr lang="en-US" sz="13800" dirty="0">
                   <a:solidFill>
-                    <a:schemeClr val="accent1">
-                      <a:lumMod val="75000"/>
-                    </a:schemeClr>
+                    <a:schemeClr val="accent1"/>
                   </a:solidFill>
                   <a:latin typeface="Tw Cen MT" panose="020B0602020104020603" pitchFamily="34" charset="77"/>
                 </a:rPr>
@@ -16704,9 +16696,7 @@
               </a:r>
               <a:endParaRPr lang="en-US" sz="7200" dirty="0">
                 <a:solidFill>
-                  <a:schemeClr val="accent1">
-                    <a:lumMod val="75000"/>
-                  </a:schemeClr>
+                  <a:schemeClr val="accent1"/>
                 </a:solidFill>
                 <a:latin typeface="Tw Cen MT" panose="020B0602020104020603" pitchFamily="34" charset="77"/>
               </a:endParaRPr>
@@ -16717,7 +16707,7 @@
     </p:spTree>
     <p:extLst>
       <p:ext uri="{BB962C8B-B14F-4D97-AF65-F5344CB8AC3E}">
-        <p14:creationId xmlns:p14="http://schemas.microsoft.com/office/powerpoint/2010/main" val="9248874"/>
+        <p14:creationId xmlns:p14="http://schemas.microsoft.com/office/powerpoint/2010/main" val="3467770637"/>
       </p:ext>
     </p:extLst>
   </p:cSld>
@@ -16746,10 +16736,10 @@
       </p:grpSpPr>
       <p:grpSp>
         <p:nvGrpSpPr>
-          <p:cNvPr id="26" name="Group 25">
+          <p:cNvPr id="25" name="Group 24">
             <a:extLst>
               <a:ext uri="{FF2B5EF4-FFF2-40B4-BE49-F238E27FC236}">
-                <a16:creationId xmlns:a16="http://schemas.microsoft.com/office/drawing/2014/main" id="{76CACCC0-D004-F84A-AD73-D8A877BF1692}"/>
+                <a16:creationId xmlns:a16="http://schemas.microsoft.com/office/drawing/2014/main" id="{B2007DCD-B00C-6145-B354-3CA63C59E58F}"/>
               </a:ext>
             </a:extLst>
           </p:cNvPr>
@@ -16758,18 +16748,18 @@
         </p:nvGrpSpPr>
         <p:grpSpPr>
           <a:xfrm>
-            <a:off x="3089571" y="1187232"/>
-            <a:ext cx="4060231" cy="3384985"/>
-            <a:chOff x="6068689" y="-83171"/>
-            <a:chExt cx="4060231" cy="3384985"/>
+            <a:off x="3120228" y="1278906"/>
+            <a:ext cx="3998917" cy="3201637"/>
+            <a:chOff x="6299895" y="2371809"/>
+            <a:chExt cx="3998917" cy="3201637"/>
           </a:xfrm>
         </p:grpSpPr>
         <p:sp>
           <p:nvSpPr>
-            <p:cNvPr id="21" name="Rounded Rectangle 20">
+            <p:cNvPr id="17" name="Round Single Corner of Rectangle 5">
               <a:extLst>
                 <a:ext uri="{FF2B5EF4-FFF2-40B4-BE49-F238E27FC236}">
-                  <a16:creationId xmlns:a16="http://schemas.microsoft.com/office/drawing/2014/main" id="{074EAE4B-F58F-0A42-AE36-024E4DDA15C5}"/>
+                  <a16:creationId xmlns:a16="http://schemas.microsoft.com/office/drawing/2014/main" id="{28F07AEA-2996-1C4B-982A-CB8065916A70}"/>
                 </a:ext>
               </a:extLst>
             </p:cNvPr>
@@ -16777,68 +16767,8 @@
             <p:nvPr/>
           </p:nvSpPr>
           <p:spPr>
-            <a:xfrm>
-              <a:off x="6097793" y="-83171"/>
-              <a:ext cx="3998918" cy="3201637"/>
-            </a:xfrm>
-            <a:prstGeom prst="roundRect">
-              <a:avLst>
-                <a:gd name="adj" fmla="val 16118"/>
-              </a:avLst>
-            </a:prstGeom>
-            <a:solidFill>
-              <a:schemeClr val="accent1">
-                <a:lumMod val="40000"/>
-                <a:lumOff val="60000"/>
-              </a:schemeClr>
-            </a:solidFill>
-            <a:ln>
-              <a:noFill/>
-            </a:ln>
-          </p:spPr>
-          <p:style>
-            <a:lnRef idx="2">
-              <a:schemeClr val="accent1">
-                <a:shade val="50000"/>
-              </a:schemeClr>
-            </a:lnRef>
-            <a:fillRef idx="1">
-              <a:schemeClr val="accent1"/>
-            </a:fillRef>
-            <a:effectRef idx="0">
-              <a:schemeClr val="accent1"/>
-            </a:effectRef>
-            <a:fontRef idx="minor">
-              <a:schemeClr val="lt1"/>
-            </a:fontRef>
-          </p:style>
-          <p:txBody>
-            <a:bodyPr rtlCol="0" anchor="ctr"/>
-            <a:lstStyle/>
-            <a:p>
-              <a:pPr algn="ctr"/>
-              <a:r>
-                <a:rPr lang="en-US" dirty="0"/>
-                <a:t>z</a:t>
-              </a:r>
-            </a:p>
-          </p:txBody>
-        </p:sp>
-        <p:sp>
-          <p:nvSpPr>
-            <p:cNvPr id="19" name="Round Single Corner of Rectangle 5">
-              <a:extLst>
-                <a:ext uri="{FF2B5EF4-FFF2-40B4-BE49-F238E27FC236}">
-                  <a16:creationId xmlns:a16="http://schemas.microsoft.com/office/drawing/2014/main" id="{3A8F96AF-C955-B249-9EE8-653BB083FC9C}"/>
-                </a:ext>
-              </a:extLst>
-            </p:cNvPr>
-            <p:cNvSpPr/>
-            <p:nvPr/>
-          </p:nvSpPr>
-          <p:spPr>
             <a:xfrm flipH="1">
-              <a:off x="6299897" y="172641"/>
+              <a:off x="6531103" y="2444273"/>
               <a:ext cx="2429334" cy="1493185"/>
             </a:xfrm>
             <a:custGeom>
@@ -16960,10 +16890,10 @@
         </p:sp>
         <p:sp>
           <p:nvSpPr>
-            <p:cNvPr id="20" name="Round Single Corner of Rectangle 19">
+            <p:cNvPr id="18" name="Round Single Corner of Rectangle 17">
               <a:extLst>
                 <a:ext uri="{FF2B5EF4-FFF2-40B4-BE49-F238E27FC236}">
-                  <a16:creationId xmlns:a16="http://schemas.microsoft.com/office/drawing/2014/main" id="{872B695B-6CF7-4447-BFF3-7555BCC1F1B6}"/>
+                  <a16:creationId xmlns:a16="http://schemas.microsoft.com/office/drawing/2014/main" id="{A377C311-6164-094C-AC1E-D8153EE34984}"/>
                 </a:ext>
               </a:extLst>
             </p:cNvPr>
@@ -16972,8 +16902,8 @@
           </p:nvSpPr>
           <p:spPr>
             <a:xfrm flipH="1">
-              <a:off x="6068689" y="100177"/>
-              <a:ext cx="4060231" cy="3201637"/>
+              <a:off x="6299895" y="2371809"/>
+              <a:ext cx="3998917" cy="3201637"/>
             </a:xfrm>
             <a:prstGeom prst="round1Rect">
               <a:avLst>
@@ -17013,6 +16943,350 @@
               <a:r>
                 <a:rPr lang="en-US" sz="13800" spc="-150" dirty="0">
                   <a:solidFill>
+                    <a:schemeClr val="bg2"/>
+                  </a:solidFill>
+                  <a:latin typeface="Tw Cen MT" panose="020B0602020104020603" pitchFamily="34" charset="77"/>
+                </a:rPr>
+                <a:t>tab</a:t>
+              </a:r>
+              <a:r>
+                <a:rPr lang="en-US" sz="1200" spc="-150" dirty="0">
+                  <a:solidFill>
+                    <a:schemeClr val="bg2"/>
+                  </a:solidFill>
+                  <a:latin typeface="Tw Cen MT" panose="020B0602020104020603" pitchFamily="34" charset="77"/>
+                </a:rPr>
+                <a:t> </a:t>
+              </a:r>
+            </a:p>
+            <a:p>
+              <a:pPr>
+                <a:lnSpc>
+                  <a:spcPct val="55000"/>
+                </a:lnSpc>
+              </a:pPr>
+              <a:r>
+                <a:rPr lang="en-US" sz="13800" dirty="0">
+                  <a:solidFill>
+                    <a:schemeClr val="accent1">
+                      <a:lumMod val="75000"/>
+                    </a:schemeClr>
+                  </a:solidFill>
+                  <a:latin typeface="Tw Cen MT" panose="020B0602020104020603" pitchFamily="34" charset="77"/>
+                </a:rPr>
+                <a:t>stack</a:t>
+              </a:r>
+              <a:endParaRPr lang="en-US" sz="7200" dirty="0">
+                <a:solidFill>
+                  <a:schemeClr val="accent1">
+                    <a:lumMod val="75000"/>
+                  </a:schemeClr>
+                </a:solidFill>
+                <a:latin typeface="Tw Cen MT" panose="020B0602020104020603" pitchFamily="34" charset="77"/>
+              </a:endParaRPr>
+            </a:p>
+          </p:txBody>
+        </p:sp>
+      </p:grpSp>
+    </p:spTree>
+    <p:extLst>
+      <p:ext uri="{BB962C8B-B14F-4D97-AF65-F5344CB8AC3E}">
+        <p14:creationId xmlns:p14="http://schemas.microsoft.com/office/powerpoint/2010/main" val="9248874"/>
+      </p:ext>
+    </p:extLst>
+  </p:cSld>
+  <p:clrMapOvr>
+    <a:masterClrMapping/>
+  </p:clrMapOvr>
+</p:sld>
+</file>
+
+<file path=ppt/slides/slide4.xml><?xml version="1.0" encoding="utf-8"?>
+<p:sld xmlns:a="http://schemas.openxmlformats.org/drawingml/2006/main" xmlns:r="http://schemas.openxmlformats.org/officeDocument/2006/relationships" xmlns:p="http://schemas.openxmlformats.org/presentationml/2006/main">
+  <p:cSld>
+    <p:spTree>
+      <p:nvGrpSpPr>
+        <p:cNvPr id="1" name=""/>
+        <p:cNvGrpSpPr/>
+        <p:nvPr/>
+      </p:nvGrpSpPr>
+      <p:grpSpPr>
+        <a:xfrm>
+          <a:off x="0" y="0"/>
+          <a:ext cx="0" cy="0"/>
+          <a:chOff x="0" y="0"/>
+          <a:chExt cx="0" cy="0"/>
+        </a:xfrm>
+      </p:grpSpPr>
+      <p:grpSp>
+        <p:nvGrpSpPr>
+          <p:cNvPr id="26" name="Group 25">
+            <a:extLst>
+              <a:ext uri="{FF2B5EF4-FFF2-40B4-BE49-F238E27FC236}">
+                <a16:creationId xmlns:a16="http://schemas.microsoft.com/office/drawing/2014/main" id="{76CACCC0-D004-F84A-AD73-D8A877BF1692}"/>
+              </a:ext>
+            </a:extLst>
+          </p:cNvPr>
+          <p:cNvGrpSpPr/>
+          <p:nvPr/>
+        </p:nvGrpSpPr>
+        <p:grpSpPr>
+          <a:xfrm>
+            <a:off x="3089571" y="1187232"/>
+            <a:ext cx="4060231" cy="3384985"/>
+            <a:chOff x="6068689" y="-83171"/>
+            <a:chExt cx="4060231" cy="3384985"/>
+          </a:xfrm>
+        </p:grpSpPr>
+        <p:sp>
+          <p:nvSpPr>
+            <p:cNvPr id="21" name="Rounded Rectangle 20">
+              <a:extLst>
+                <a:ext uri="{FF2B5EF4-FFF2-40B4-BE49-F238E27FC236}">
+                  <a16:creationId xmlns:a16="http://schemas.microsoft.com/office/drawing/2014/main" id="{074EAE4B-F58F-0A42-AE36-024E4DDA15C5}"/>
+                </a:ext>
+              </a:extLst>
+            </p:cNvPr>
+            <p:cNvSpPr/>
+            <p:nvPr/>
+          </p:nvSpPr>
+          <p:spPr>
+            <a:xfrm>
+              <a:off x="6097793" y="-83171"/>
+              <a:ext cx="3998918" cy="3201637"/>
+            </a:xfrm>
+            <a:prstGeom prst="roundRect">
+              <a:avLst>
+                <a:gd name="adj" fmla="val 16118"/>
+              </a:avLst>
+            </a:prstGeom>
+            <a:solidFill>
+              <a:schemeClr val="accent1">
+                <a:lumMod val="40000"/>
+                <a:lumOff val="60000"/>
+              </a:schemeClr>
+            </a:solidFill>
+            <a:ln>
+              <a:noFill/>
+            </a:ln>
+          </p:spPr>
+          <p:style>
+            <a:lnRef idx="2">
+              <a:schemeClr val="accent1">
+                <a:shade val="50000"/>
+              </a:schemeClr>
+            </a:lnRef>
+            <a:fillRef idx="1">
+              <a:schemeClr val="accent1"/>
+            </a:fillRef>
+            <a:effectRef idx="0">
+              <a:schemeClr val="accent1"/>
+            </a:effectRef>
+            <a:fontRef idx="minor">
+              <a:schemeClr val="lt1"/>
+            </a:fontRef>
+          </p:style>
+          <p:txBody>
+            <a:bodyPr rtlCol="0" anchor="ctr"/>
+            <a:lstStyle/>
+            <a:p>
+              <a:pPr algn="ctr"/>
+              <a:r>
+                <a:rPr lang="en-US" dirty="0"/>
+                <a:t>z</a:t>
+              </a:r>
+            </a:p>
+          </p:txBody>
+        </p:sp>
+        <p:sp>
+          <p:nvSpPr>
+            <p:cNvPr id="19" name="Round Single Corner of Rectangle 5">
+              <a:extLst>
+                <a:ext uri="{FF2B5EF4-FFF2-40B4-BE49-F238E27FC236}">
+                  <a16:creationId xmlns:a16="http://schemas.microsoft.com/office/drawing/2014/main" id="{3A8F96AF-C955-B249-9EE8-653BB083FC9C}"/>
+                </a:ext>
+              </a:extLst>
+            </p:cNvPr>
+            <p:cNvSpPr/>
+            <p:nvPr/>
+          </p:nvSpPr>
+          <p:spPr>
+            <a:xfrm flipH="1">
+              <a:off x="6299897" y="172641"/>
+              <a:ext cx="2429334" cy="1493185"/>
+            </a:xfrm>
+            <a:custGeom>
+              <a:avLst/>
+              <a:gdLst>
+                <a:gd name="connsiteX0" fmla="*/ 0 w 1800000"/>
+                <a:gd name="connsiteY0" fmla="*/ 0 h 1800000"/>
+                <a:gd name="connsiteX1" fmla="*/ 1375254 w 1800000"/>
+                <a:gd name="connsiteY1" fmla="*/ 0 h 1800000"/>
+                <a:gd name="connsiteX2" fmla="*/ 1800000 w 1800000"/>
+                <a:gd name="connsiteY2" fmla="*/ 424746 h 1800000"/>
+                <a:gd name="connsiteX3" fmla="*/ 1800000 w 1800000"/>
+                <a:gd name="connsiteY3" fmla="*/ 1800000 h 1800000"/>
+                <a:gd name="connsiteX4" fmla="*/ 0 w 1800000"/>
+                <a:gd name="connsiteY4" fmla="*/ 1800000 h 1800000"/>
+                <a:gd name="connsiteX5" fmla="*/ 0 w 1800000"/>
+                <a:gd name="connsiteY5" fmla="*/ 0 h 1800000"/>
+                <a:gd name="connsiteX0" fmla="*/ 199333 w 1999333"/>
+                <a:gd name="connsiteY0" fmla="*/ 150501 h 1950501"/>
+                <a:gd name="connsiteX1" fmla="*/ 1574587 w 1999333"/>
+                <a:gd name="connsiteY1" fmla="*/ 150501 h 1950501"/>
+                <a:gd name="connsiteX2" fmla="*/ 1999333 w 1999333"/>
+                <a:gd name="connsiteY2" fmla="*/ 575247 h 1950501"/>
+                <a:gd name="connsiteX3" fmla="*/ 1999333 w 1999333"/>
+                <a:gd name="connsiteY3" fmla="*/ 1950501 h 1950501"/>
+                <a:gd name="connsiteX4" fmla="*/ 199333 w 1999333"/>
+                <a:gd name="connsiteY4" fmla="*/ 1950501 h 1950501"/>
+                <a:gd name="connsiteX5" fmla="*/ 199333 w 1999333"/>
+                <a:gd name="connsiteY5" fmla="*/ 150501 h 1950501"/>
+                <a:gd name="connsiteX0" fmla="*/ 199333 w 1999333"/>
+                <a:gd name="connsiteY0" fmla="*/ 73407 h 1873407"/>
+                <a:gd name="connsiteX1" fmla="*/ 1999333 w 1999333"/>
+                <a:gd name="connsiteY1" fmla="*/ 498153 h 1873407"/>
+                <a:gd name="connsiteX2" fmla="*/ 1999333 w 1999333"/>
+                <a:gd name="connsiteY2" fmla="*/ 1873407 h 1873407"/>
+                <a:gd name="connsiteX3" fmla="*/ 199333 w 1999333"/>
+                <a:gd name="connsiteY3" fmla="*/ 1873407 h 1873407"/>
+                <a:gd name="connsiteX4" fmla="*/ 199333 w 1999333"/>
+                <a:gd name="connsiteY4" fmla="*/ 73407 h 1873407"/>
+              </a:gdLst>
+              <a:ahLst/>
+              <a:cxnLst>
+                <a:cxn ang="0">
+                  <a:pos x="connsiteX0" y="connsiteY0"/>
+                </a:cxn>
+                <a:cxn ang="0">
+                  <a:pos x="connsiteX1" y="connsiteY1"/>
+                </a:cxn>
+                <a:cxn ang="0">
+                  <a:pos x="connsiteX2" y="connsiteY2"/>
+                </a:cxn>
+                <a:cxn ang="0">
+                  <a:pos x="connsiteX3" y="connsiteY3"/>
+                </a:cxn>
+                <a:cxn ang="0">
+                  <a:pos x="connsiteX4" y="connsiteY4"/>
+                </a:cxn>
+              </a:cxnLst>
+              <a:rect l="l" t="t" r="r" b="b"/>
+              <a:pathLst>
+                <a:path w="1999333" h="1873407">
+                  <a:moveTo>
+                    <a:pt x="199333" y="73407"/>
+                  </a:moveTo>
+                  <a:cubicBezTo>
+                    <a:pt x="499333" y="-155802"/>
+                    <a:pt x="1699333" y="198153"/>
+                    <a:pt x="1999333" y="498153"/>
+                  </a:cubicBezTo>
+                  <a:lnTo>
+                    <a:pt x="1999333" y="1873407"/>
+                  </a:lnTo>
+                  <a:lnTo>
+                    <a:pt x="199333" y="1873407"/>
+                  </a:lnTo>
+                  <a:cubicBezTo>
+                    <a:pt x="-100667" y="1573407"/>
+                    <a:pt x="-29876" y="373407"/>
+                    <a:pt x="199333" y="73407"/>
+                  </a:cubicBezTo>
+                  <a:close/>
+                </a:path>
+              </a:pathLst>
+            </a:custGeom>
+            <a:ln>
+              <a:noFill/>
+            </a:ln>
+          </p:spPr>
+          <p:style>
+            <a:lnRef idx="2">
+              <a:schemeClr val="accent1">
+                <a:shade val="50000"/>
+              </a:schemeClr>
+            </a:lnRef>
+            <a:fillRef idx="1">
+              <a:schemeClr val="accent1"/>
+            </a:fillRef>
+            <a:effectRef idx="0">
+              <a:schemeClr val="accent1"/>
+            </a:effectRef>
+            <a:fontRef idx="minor">
+              <a:schemeClr val="lt1"/>
+            </a:fontRef>
+          </p:style>
+          <p:txBody>
+            <a:bodyPr wrap="none" lIns="251999" tIns="396000" rIns="180000" rtlCol="0" anchor="ctr"/>
+            <a:lstStyle/>
+            <a:p>
+              <a:pPr algn="ctr">
+                <a:lnSpc>
+                  <a:spcPct val="70000"/>
+                </a:lnSpc>
+              </a:pPr>
+              <a:endParaRPr lang="en-US" sz="7200" spc="-300" dirty="0">
+                <a:latin typeface="Tw Cen MT" panose="020B0602020104020603" pitchFamily="34" charset="77"/>
+              </a:endParaRPr>
+            </a:p>
+          </p:txBody>
+        </p:sp>
+        <p:sp>
+          <p:nvSpPr>
+            <p:cNvPr id="20" name="Round Single Corner of Rectangle 19">
+              <a:extLst>
+                <a:ext uri="{FF2B5EF4-FFF2-40B4-BE49-F238E27FC236}">
+                  <a16:creationId xmlns:a16="http://schemas.microsoft.com/office/drawing/2014/main" id="{872B695B-6CF7-4447-BFF3-7555BCC1F1B6}"/>
+                </a:ext>
+              </a:extLst>
+            </p:cNvPr>
+            <p:cNvSpPr/>
+            <p:nvPr/>
+          </p:nvSpPr>
+          <p:spPr>
+            <a:xfrm flipH="1">
+              <a:off x="6068689" y="100177"/>
+              <a:ext cx="4060231" cy="3201637"/>
+            </a:xfrm>
+            <a:prstGeom prst="round1Rect">
+              <a:avLst>
+                <a:gd name="adj" fmla="val 0"/>
+              </a:avLst>
+            </a:prstGeom>
+            <a:noFill/>
+            <a:ln>
+              <a:noFill/>
+            </a:ln>
+          </p:spPr>
+          <p:style>
+            <a:lnRef idx="2">
+              <a:schemeClr val="accent1">
+                <a:shade val="50000"/>
+              </a:schemeClr>
+            </a:lnRef>
+            <a:fillRef idx="1">
+              <a:schemeClr val="accent1"/>
+            </a:fillRef>
+            <a:effectRef idx="0">
+              <a:schemeClr val="accent1"/>
+            </a:effectRef>
+            <a:fontRef idx="minor">
+              <a:schemeClr val="lt1"/>
+            </a:fontRef>
+          </p:style>
+          <p:txBody>
+            <a:bodyPr wrap="none" lIns="251999" tIns="396000" rIns="180000" rtlCol="0" anchor="ctr"/>
+            <a:lstStyle/>
+            <a:p>
+              <a:pPr>
+                <a:lnSpc>
+                  <a:spcPct val="55000"/>
+                </a:lnSpc>
+              </a:pPr>
+              <a:r>
+                <a:rPr lang="en-US" sz="13800" spc="-150" dirty="0">
+                  <a:solidFill>
                     <a:schemeClr val="tx1"/>
                   </a:solidFill>
                   <a:latin typeface="Tw Cen MT" panose="020B0602020104020603" pitchFamily="34" charset="77"/>
@@ -17071,7 +17345,7 @@
 </p:sld>
 </file>
 
-<file path=ppt/slides/slide4.xml><?xml version="1.0" encoding="utf-8"?>
+<file path=ppt/slides/slide5.xml><?xml version="1.0" encoding="utf-8"?>
 <p:sld xmlns:a="http://schemas.openxmlformats.org/drawingml/2006/main" xmlns:r="http://schemas.openxmlformats.org/officeDocument/2006/relationships" xmlns:p="http://schemas.openxmlformats.org/presentationml/2006/main">
   <p:cSld>
     <p:spTree>
@@ -17241,7 +17515,7 @@
 </p:sld>
 </file>
 
-<file path=ppt/slides/slide5.xml><?xml version="1.0" encoding="utf-8"?>
+<file path=ppt/slides/slide6.xml><?xml version="1.0" encoding="utf-8"?>
 <p:sld xmlns:a="http://schemas.openxmlformats.org/drawingml/2006/main" xmlns:r="http://schemas.openxmlformats.org/officeDocument/2006/relationships" xmlns:p="http://schemas.openxmlformats.org/presentationml/2006/main">
   <p:cSld>
     <p:spTree>

</xml_diff>